<commit_message>
presentation for user group meeting.
</commit_message>
<xml_diff>
--- a/documentation/Project Overview - UserGroup Presentation.pptx
+++ b/documentation/Project Overview - UserGroup Presentation.pptx
@@ -6,12 +6,19 @@
   </p:sldMasterIdLst>
   <p:sldIdLst>
     <p:sldId id="256" r:id="rId2"/>
-    <p:sldId id="257" r:id="rId3"/>
-    <p:sldId id="258" r:id="rId4"/>
-    <p:sldId id="259" r:id="rId5"/>
-    <p:sldId id="260" r:id="rId6"/>
-    <p:sldId id="261" r:id="rId7"/>
-    <p:sldId id="262" r:id="rId8"/>
+    <p:sldId id="269" r:id="rId3"/>
+    <p:sldId id="257" r:id="rId4"/>
+    <p:sldId id="258" r:id="rId5"/>
+    <p:sldId id="259" r:id="rId6"/>
+    <p:sldId id="260" r:id="rId7"/>
+    <p:sldId id="261" r:id="rId8"/>
+    <p:sldId id="262" r:id="rId9"/>
+    <p:sldId id="264" r:id="rId10"/>
+    <p:sldId id="263" r:id="rId11"/>
+    <p:sldId id="266" r:id="rId12"/>
+    <p:sldId id="267" r:id="rId13"/>
+    <p:sldId id="268" r:id="rId14"/>
+    <p:sldId id="265" r:id="rId15"/>
   </p:sldIdLst>
   <p:sldSz cx="12192000" cy="6858000"/>
   <p:notesSz cx="6858000" cy="9144000"/>
@@ -110,6 +117,11 @@
       </a:defRPr>
     </a:lvl9pPr>
   </p:defaultTextStyle>
+  <p:extLst>
+    <p:ext uri="{EFAFB233-063F-42B5-8137-9DF3F51BA10A}">
+      <p15:sldGuideLst xmlns:p15="http://schemas.microsoft.com/office/powerpoint/2012/main"/>
+    </p:ext>
+  </p:extLst>
 </p:presentation>
 </file>
 
@@ -760,7 +772,7 @@
             <a:fld id="{1E700B27-DE4C-4B9E-BB11-B9027034A00F}" type="datetimeFigureOut">
               <a:rPr lang="en-US" dirty="0"/>
               <a:pPr/>
-              <a:t>10/21/2015</a:t>
+              <a:t>10/26/2015</a:t>
             </a:fld>
             <a:endParaRPr lang="en-US" dirty="0"/>
           </a:p>
@@ -1880,7 +1892,7 @@
           <a:p>
             <a:fld id="{C40F4739-9812-4A9F-890D-2AD6BA5F6EE8}" type="datetimeFigureOut">
               <a:rPr lang="en-US" dirty="0"/>
-              <a:t>10/21/2015</a:t>
+              <a:t>10/26/2015</a:t>
             </a:fld>
             <a:endParaRPr lang="en-US" dirty="0"/>
           </a:p>
@@ -2891,7 +2903,7 @@
           <a:p>
             <a:fld id="{18845AC5-A3F8-44AA-BA8F-596CDCC976D3}" type="datetimeFigureOut">
               <a:rPr lang="en-US" dirty="0"/>
-              <a:t>10/21/2015</a:t>
+              <a:t>10/26/2015</a:t>
             </a:fld>
             <a:endParaRPr lang="en-US" dirty="0"/>
           </a:p>
@@ -4061,7 +4073,7 @@
           <a:p>
             <a:fld id="{C873B183-A821-4095-A363-9EC968635539}" type="datetimeFigureOut">
               <a:rPr lang="en-US" dirty="0"/>
-              <a:t>10/21/2015</a:t>
+              <a:t>10/26/2015</a:t>
             </a:fld>
             <a:endParaRPr lang="en-US" dirty="0"/>
           </a:p>
@@ -5122,7 +5134,7 @@
           <a:p>
             <a:fld id="{174D01B4-0AA5-45E6-B2E6-5FA4078AEBCF}" type="datetimeFigureOut">
               <a:rPr lang="en-US" dirty="0"/>
-              <a:t>10/21/2015</a:t>
+              <a:t>10/26/2015</a:t>
             </a:fld>
             <a:endParaRPr lang="en-US" dirty="0"/>
           </a:p>
@@ -5768,7 +5780,7 @@
           <a:p>
             <a:fld id="{4147335C-0450-40D7-8612-B3203BED4F28}" type="datetimeFigureOut">
               <a:rPr lang="en-US" dirty="0"/>
-              <a:t>10/21/2015</a:t>
+              <a:t>10/26/2015</a:t>
             </a:fld>
             <a:endParaRPr lang="en-US" dirty="0"/>
           </a:p>
@@ -6615,7 +6627,7 @@
           <a:p>
             <a:fld id="{D246A105-2A1C-4284-B4EA-07CF89B1A393}" type="datetimeFigureOut">
               <a:rPr lang="en-US" dirty="0"/>
-              <a:t>10/21/2015</a:t>
+              <a:t>10/26/2015</a:t>
             </a:fld>
             <a:endParaRPr lang="en-US" dirty="0"/>
           </a:p>
@@ -6790,7 +6802,7 @@
           <a:p>
             <a:fld id="{80DBE609-F3F2-45E6-BD6A-E03A8C86C1AE}" type="datetimeFigureOut">
               <a:rPr lang="en-US" dirty="0"/>
-              <a:t>10/21/2015</a:t>
+              <a:t>10/26/2015</a:t>
             </a:fld>
             <a:endParaRPr lang="en-US" dirty="0"/>
           </a:p>
@@ -7788,7 +7800,7 @@
           <a:p>
             <a:fld id="{7A24AD68-089C-4467-A8F3-EA2BBCA6B44E}" type="datetimeFigureOut">
               <a:rPr lang="en-US" dirty="0"/>
-              <a:t>10/21/2015</a:t>
+              <a:t>10/26/2015</a:t>
             </a:fld>
             <a:endParaRPr lang="en-US" dirty="0"/>
           </a:p>
@@ -7994,7 +8006,7 @@
           <a:p>
             <a:fld id="{75C51FCE-E4BB-4680-8E50-3C0E348D2609}" type="datetimeFigureOut">
               <a:rPr lang="en-US" dirty="0"/>
-              <a:t>10/21/2015</a:t>
+              <a:t>10/26/2015</a:t>
             </a:fld>
             <a:endParaRPr lang="en-US" dirty="0"/>
           </a:p>
@@ -9056,7 +9068,7 @@
           <a:p>
             <a:fld id="{8AAA073D-A903-47F8-8D16-77642FB0DF1F}" type="datetimeFigureOut">
               <a:rPr lang="en-US" dirty="0"/>
-              <a:t>10/21/2015</a:t>
+              <a:t>10/26/2015</a:t>
             </a:fld>
             <a:endParaRPr lang="en-US" dirty="0"/>
           </a:p>
@@ -9328,7 +9340,7 @@
           <a:p>
             <a:fld id="{AB91FA40-626B-4CA1-85D0-7A9016E395BA}" type="datetimeFigureOut">
               <a:rPr lang="en-US" dirty="0"/>
-              <a:t>10/21/2015</a:t>
+              <a:t>10/26/2015</a:t>
             </a:fld>
             <a:endParaRPr lang="en-US" dirty="0"/>
           </a:p>
@@ -9710,7 +9722,7 @@
           <a:p>
             <a:fld id="{C3F425EA-B9DC-48A7-991E-9A82573B1B21}" type="datetimeFigureOut">
               <a:rPr lang="en-US" dirty="0"/>
-              <a:t>10/21/2015</a:t>
+              <a:t>10/26/2015</a:t>
             </a:fld>
             <a:endParaRPr lang="en-US" dirty="0"/>
           </a:p>
@@ -9828,7 +9840,7 @@
           <a:p>
             <a:fld id="{66CB97F8-6CEB-469B-AFCC-889F2A2B1D5A}" type="datetimeFigureOut">
               <a:rPr lang="en-US" dirty="0"/>
-              <a:t>10/21/2015</a:t>
+              <a:t>10/26/2015</a:t>
             </a:fld>
             <a:endParaRPr lang="en-US" dirty="0"/>
           </a:p>
@@ -9923,7 +9935,7 @@
           <a:p>
             <a:fld id="{8FA9179F-009E-4FA5-B091-7EBB82A185BD}" type="datetimeFigureOut">
               <a:rPr lang="en-US" dirty="0"/>
-              <a:t>10/21/2015</a:t>
+              <a:t>10/26/2015</a:t>
             </a:fld>
             <a:endParaRPr lang="en-US" dirty="0"/>
           </a:p>
@@ -11032,7 +11044,7 @@
           <a:p>
             <a:fld id="{8E665CEB-0076-4E37-B880-BCEA9784DE0A}" type="datetimeFigureOut">
               <a:rPr lang="en-US" dirty="0"/>
-              <a:t>10/21/2015</a:t>
+              <a:t>10/26/2015</a:t>
             </a:fld>
             <a:endParaRPr lang="en-US" dirty="0"/>
           </a:p>
@@ -12165,7 +12177,7 @@
           <a:p>
             <a:fld id="{A6149E5E-3896-4118-99A7-7B85668F1C5E}" type="datetimeFigureOut">
               <a:rPr lang="en-US" dirty="0"/>
-              <a:t>10/21/2015</a:t>
+              <a:t>10/26/2015</a:t>
             </a:fld>
             <a:endParaRPr lang="en-US" dirty="0"/>
           </a:p>
@@ -13193,7 +13205,7 @@
           <a:p>
             <a:fld id="{7E0D914D-B099-4142-A885-11F276715148}" type="datetimeFigureOut">
               <a:rPr lang="en-US" dirty="0"/>
-              <a:t>10/21/2015</a:t>
+              <a:t>10/26/2015</a:t>
             </a:fld>
             <a:endParaRPr lang="en-US" dirty="0"/>
           </a:p>
@@ -13925,7 +13937,11 @@
             </a:r>
             <a:r>
               <a:rPr lang="en-CA" sz="2000" dirty="0" smtClean="0"/>
-              <a:t>: mike.king@prolucid.ca</a:t>
+              <a:t>: </a:t>
+            </a:r>
+            <a:r>
+              <a:rPr lang="en-CA" sz="2000" dirty="0" smtClean="0"/>
+              <a:t>unipsycho@gmail.com</a:t>
             </a:r>
             <a:endParaRPr lang="en-CA" sz="2000" dirty="0"/>
           </a:p>
@@ -13935,6 +13951,1000 @@
     <p:extLst>
       <p:ext uri="{BB962C8B-B14F-4D97-AF65-F5344CB8AC3E}">
         <p14:creationId xmlns:p14="http://schemas.microsoft.com/office/powerpoint/2010/main" val="3384882995"/>
+      </p:ext>
+    </p:extLst>
+  </p:cSld>
+  <p:clrMapOvr>
+    <a:masterClrMapping/>
+  </p:clrMapOvr>
+</p:sld>
+</file>
+
+<file path=ppt/slides/slide10.xml><?xml version="1.0" encoding="utf-8"?>
+<p:sld xmlns:a="http://schemas.openxmlformats.org/drawingml/2006/main" xmlns:r="http://schemas.openxmlformats.org/officeDocument/2006/relationships" xmlns:p="http://schemas.openxmlformats.org/presentationml/2006/main">
+  <p:cSld>
+    <p:spTree>
+      <p:nvGrpSpPr>
+        <p:cNvPr id="1" name=""/>
+        <p:cNvGrpSpPr/>
+        <p:nvPr/>
+      </p:nvGrpSpPr>
+      <p:grpSpPr>
+        <a:xfrm>
+          <a:off x="0" y="0"/>
+          <a:ext cx="0" cy="0"/>
+          <a:chOff x="0" y="0"/>
+          <a:chExt cx="0" cy="0"/>
+        </a:xfrm>
+      </p:grpSpPr>
+      <p:sp>
+        <p:nvSpPr>
+          <p:cNvPr id="2" name="Title 1"/>
+          <p:cNvSpPr>
+            <a:spLocks noGrp="1"/>
+          </p:cNvSpPr>
+          <p:nvPr>
+            <p:ph type="title"/>
+          </p:nvPr>
+        </p:nvSpPr>
+        <p:spPr/>
+        <p:txBody>
+          <a:bodyPr/>
+          <a:lstStyle/>
+          <a:p>
+            <a:r>
+              <a:rPr lang="en-CA" dirty="0" err="1" smtClean="0"/>
+              <a:t>DataGridView</a:t>
+            </a:r>
+            <a:r>
+              <a:rPr lang="en-CA" dirty="0" smtClean="0"/>
+              <a:t> Properties</a:t>
+            </a:r>
+            <a:endParaRPr lang="en-CA" dirty="0"/>
+          </a:p>
+        </p:txBody>
+      </p:sp>
+      <p:pic>
+        <p:nvPicPr>
+          <p:cNvPr id="4" name="Content Placeholder 3"/>
+          <p:cNvPicPr>
+            <a:picLocks noGrp="1" noChangeAspect="1"/>
+          </p:cNvPicPr>
+          <p:nvPr>
+            <p:ph idx="1"/>
+          </p:nvPr>
+        </p:nvPicPr>
+        <p:blipFill rotWithShape="1">
+          <a:blip r:embed="rId2"/>
+          <a:srcRect l="57799" t="37181" r="27008" b="28266"/>
+          <a:stretch/>
+        </p:blipFill>
+        <p:spPr>
+          <a:xfrm>
+            <a:off x="739833" y="2618509"/>
+            <a:ext cx="2726576" cy="3488050"/>
+          </a:xfrm>
+          <a:prstGeom prst="rect">
+            <a:avLst/>
+          </a:prstGeom>
+        </p:spPr>
+      </p:pic>
+      <p:sp>
+        <p:nvSpPr>
+          <p:cNvPr id="5" name="Content Placeholder 2"/>
+          <p:cNvSpPr txBox="1">
+            <a:spLocks/>
+          </p:cNvSpPr>
+          <p:nvPr/>
+        </p:nvSpPr>
+        <p:spPr>
+          <a:xfrm>
+            <a:off x="3765665" y="2603500"/>
+            <a:ext cx="7813964" cy="3416300"/>
+          </a:xfrm>
+          <a:prstGeom prst="rect">
+            <a:avLst/>
+          </a:prstGeom>
+        </p:spPr>
+        <p:txBody>
+          <a:bodyPr vert="horz" lIns="91440" tIns="45720" rIns="91440" bIns="45720" rtlCol="0">
+            <a:normAutofit/>
+          </a:bodyPr>
+          <a:lstStyle>
+            <a:lvl1pPr marL="342900" indent="-342900" algn="l" defTabSz="457200" rtl="0" eaLnBrk="1" latinLnBrk="0" hangingPunct="1">
+              <a:spcBef>
+                <a:spcPts val="1000"/>
+              </a:spcBef>
+              <a:spcAft>
+                <a:spcPts val="0"/>
+              </a:spcAft>
+              <a:buClr>
+                <a:schemeClr val="accent1"/>
+              </a:buClr>
+              <a:buSzPct val="80000"/>
+              <a:buFont typeface="Wingdings 3" charset="2"/>
+              <a:buChar char=""/>
+              <a:defRPr sz="1800" b="0" i="0" kern="1200">
+                <a:solidFill>
+                  <a:schemeClr val="tx1">
+                    <a:lumMod val="75000"/>
+                    <a:lumOff val="25000"/>
+                  </a:schemeClr>
+                </a:solidFill>
+                <a:latin typeface="+mn-lt"/>
+                <a:ea typeface="+mn-ea"/>
+                <a:cs typeface="+mn-cs"/>
+              </a:defRPr>
+            </a:lvl1pPr>
+            <a:lvl2pPr marL="742950" indent="-285750" algn="l" defTabSz="457200" rtl="0" eaLnBrk="1" latinLnBrk="0" hangingPunct="1">
+              <a:spcBef>
+                <a:spcPts val="1000"/>
+              </a:spcBef>
+              <a:spcAft>
+                <a:spcPts val="0"/>
+              </a:spcAft>
+              <a:buClr>
+                <a:schemeClr val="accent1"/>
+              </a:buClr>
+              <a:buSzPct val="80000"/>
+              <a:buFont typeface="Wingdings 3" charset="2"/>
+              <a:buChar char=""/>
+              <a:defRPr sz="1600" b="0" i="0" kern="1200">
+                <a:solidFill>
+                  <a:schemeClr val="tx1">
+                    <a:lumMod val="75000"/>
+                    <a:lumOff val="25000"/>
+                  </a:schemeClr>
+                </a:solidFill>
+                <a:latin typeface="+mn-lt"/>
+                <a:ea typeface="+mn-ea"/>
+                <a:cs typeface="+mn-cs"/>
+              </a:defRPr>
+            </a:lvl2pPr>
+            <a:lvl3pPr marL="1143000" indent="-228600" algn="l" defTabSz="457200" rtl="0" eaLnBrk="1" latinLnBrk="0" hangingPunct="1">
+              <a:spcBef>
+                <a:spcPts val="1000"/>
+              </a:spcBef>
+              <a:spcAft>
+                <a:spcPts val="0"/>
+              </a:spcAft>
+              <a:buClr>
+                <a:schemeClr val="accent1"/>
+              </a:buClr>
+              <a:buSzPct val="80000"/>
+              <a:buFont typeface="Wingdings 3" charset="2"/>
+              <a:buChar char=""/>
+              <a:defRPr sz="1400" b="0" i="0" kern="1200">
+                <a:solidFill>
+                  <a:schemeClr val="tx1">
+                    <a:lumMod val="75000"/>
+                    <a:lumOff val="25000"/>
+                  </a:schemeClr>
+                </a:solidFill>
+                <a:latin typeface="+mn-lt"/>
+                <a:ea typeface="+mn-ea"/>
+                <a:cs typeface="+mn-cs"/>
+              </a:defRPr>
+            </a:lvl3pPr>
+            <a:lvl4pPr marL="1600200" indent="-228600" algn="l" defTabSz="457200" rtl="0" eaLnBrk="1" latinLnBrk="0" hangingPunct="1">
+              <a:spcBef>
+                <a:spcPts val="1000"/>
+              </a:spcBef>
+              <a:spcAft>
+                <a:spcPts val="0"/>
+              </a:spcAft>
+              <a:buClr>
+                <a:schemeClr val="accent1"/>
+              </a:buClr>
+              <a:buSzPct val="80000"/>
+              <a:buFont typeface="Wingdings 3" charset="2"/>
+              <a:buChar char=""/>
+              <a:defRPr sz="1200" b="0" i="0" kern="1200">
+                <a:solidFill>
+                  <a:schemeClr val="tx1">
+                    <a:lumMod val="75000"/>
+                    <a:lumOff val="25000"/>
+                  </a:schemeClr>
+                </a:solidFill>
+                <a:latin typeface="+mn-lt"/>
+                <a:ea typeface="+mn-ea"/>
+                <a:cs typeface="+mn-cs"/>
+              </a:defRPr>
+            </a:lvl4pPr>
+            <a:lvl5pPr marL="2057400" indent="-228600" algn="l" defTabSz="457200" rtl="0" eaLnBrk="1" latinLnBrk="0" hangingPunct="1">
+              <a:spcBef>
+                <a:spcPts val="1000"/>
+              </a:spcBef>
+              <a:spcAft>
+                <a:spcPts val="0"/>
+              </a:spcAft>
+              <a:buClr>
+                <a:schemeClr val="accent1"/>
+              </a:buClr>
+              <a:buSzPct val="80000"/>
+              <a:buFont typeface="Wingdings 3" charset="2"/>
+              <a:buChar char=""/>
+              <a:defRPr sz="1200" b="0" i="0" kern="1200">
+                <a:solidFill>
+                  <a:schemeClr val="tx1">
+                    <a:lumMod val="75000"/>
+                    <a:lumOff val="25000"/>
+                  </a:schemeClr>
+                </a:solidFill>
+                <a:latin typeface="+mn-lt"/>
+                <a:ea typeface="+mn-ea"/>
+                <a:cs typeface="+mn-cs"/>
+              </a:defRPr>
+            </a:lvl5pPr>
+            <a:lvl6pPr marL="2514600" indent="-228600" algn="l" defTabSz="457200" rtl="0" eaLnBrk="1" latinLnBrk="0" hangingPunct="1">
+              <a:spcBef>
+                <a:spcPts val="1000"/>
+              </a:spcBef>
+              <a:spcAft>
+                <a:spcPts val="0"/>
+              </a:spcAft>
+              <a:buClr>
+                <a:schemeClr val="accent1"/>
+              </a:buClr>
+              <a:buSzPct val="80000"/>
+              <a:buFont typeface="Wingdings 3" charset="2"/>
+              <a:buChar char=""/>
+              <a:defRPr sz="1200" b="0" i="0" kern="1200">
+                <a:solidFill>
+                  <a:schemeClr val="tx1">
+                    <a:lumMod val="75000"/>
+                    <a:lumOff val="25000"/>
+                  </a:schemeClr>
+                </a:solidFill>
+                <a:latin typeface="+mn-lt"/>
+                <a:ea typeface="+mn-ea"/>
+                <a:cs typeface="+mn-cs"/>
+              </a:defRPr>
+            </a:lvl6pPr>
+            <a:lvl7pPr marL="2971800" indent="-228600" algn="l" defTabSz="457200" rtl="0" eaLnBrk="1" latinLnBrk="0" hangingPunct="1">
+              <a:spcBef>
+                <a:spcPts val="1000"/>
+              </a:spcBef>
+              <a:spcAft>
+                <a:spcPts val="0"/>
+              </a:spcAft>
+              <a:buClr>
+                <a:schemeClr val="accent1"/>
+              </a:buClr>
+              <a:buSzPct val="80000"/>
+              <a:buFont typeface="Wingdings 3" charset="2"/>
+              <a:buChar char=""/>
+              <a:defRPr sz="1200" b="0" i="0" kern="1200">
+                <a:solidFill>
+                  <a:schemeClr val="tx1">
+                    <a:lumMod val="75000"/>
+                    <a:lumOff val="25000"/>
+                  </a:schemeClr>
+                </a:solidFill>
+                <a:latin typeface="+mn-lt"/>
+                <a:ea typeface="+mn-ea"/>
+                <a:cs typeface="+mn-cs"/>
+              </a:defRPr>
+            </a:lvl7pPr>
+            <a:lvl8pPr marL="3429000" indent="-228600" algn="l" defTabSz="457200" rtl="0" eaLnBrk="1" latinLnBrk="0" hangingPunct="1">
+              <a:spcBef>
+                <a:spcPts val="1000"/>
+              </a:spcBef>
+              <a:spcAft>
+                <a:spcPts val="0"/>
+              </a:spcAft>
+              <a:buClr>
+                <a:schemeClr val="accent1"/>
+              </a:buClr>
+              <a:buSzPct val="80000"/>
+              <a:buFont typeface="Wingdings 3" charset="2"/>
+              <a:buChar char=""/>
+              <a:defRPr sz="1200" b="0" i="0" kern="1200">
+                <a:solidFill>
+                  <a:schemeClr val="tx1">
+                    <a:lumMod val="75000"/>
+                    <a:lumOff val="25000"/>
+                  </a:schemeClr>
+                </a:solidFill>
+                <a:latin typeface="+mn-lt"/>
+                <a:ea typeface="+mn-ea"/>
+                <a:cs typeface="+mn-cs"/>
+              </a:defRPr>
+            </a:lvl8pPr>
+            <a:lvl9pPr marL="3886200" indent="-228600" algn="l" defTabSz="457200" rtl="0" eaLnBrk="1" latinLnBrk="0" hangingPunct="1">
+              <a:spcBef>
+                <a:spcPts val="1000"/>
+              </a:spcBef>
+              <a:spcAft>
+                <a:spcPts val="0"/>
+              </a:spcAft>
+              <a:buClr>
+                <a:schemeClr val="accent1"/>
+              </a:buClr>
+              <a:buSzPct val="80000"/>
+              <a:buFont typeface="Wingdings 3" charset="2"/>
+              <a:buChar char=""/>
+              <a:defRPr sz="1200" b="0" i="0" kern="1200">
+                <a:solidFill>
+                  <a:schemeClr val="tx1">
+                    <a:lumMod val="75000"/>
+                    <a:lumOff val="25000"/>
+                  </a:schemeClr>
+                </a:solidFill>
+                <a:latin typeface="+mn-lt"/>
+                <a:ea typeface="+mn-ea"/>
+                <a:cs typeface="+mn-cs"/>
+              </a:defRPr>
+            </a:lvl9pPr>
+          </a:lstStyle>
+          <a:p>
+            <a:pPr marL="0" indent="0">
+              <a:buNone/>
+            </a:pPr>
+            <a:r>
+              <a:rPr lang="en-CA" dirty="0" smtClean="0"/>
+              <a:t>Many basic features and properties are working</a:t>
+            </a:r>
+          </a:p>
+          <a:p>
+            <a:r>
+              <a:rPr lang="en-CA" dirty="0" smtClean="0"/>
+              <a:t>Adjustments and editing</a:t>
+            </a:r>
+          </a:p>
+          <a:p>
+            <a:r>
+              <a:rPr lang="en-CA" dirty="0" smtClean="0"/>
+              <a:t>Visibility</a:t>
+            </a:r>
+          </a:p>
+          <a:p>
+            <a:r>
+              <a:rPr lang="en-CA" dirty="0" smtClean="0"/>
+              <a:t>Colors (Separate Class)</a:t>
+            </a:r>
+          </a:p>
+          <a:p>
+            <a:r>
+              <a:rPr lang="en-CA" dirty="0" smtClean="0"/>
+              <a:t>Cell Styles (Separate Class)</a:t>
+            </a:r>
+          </a:p>
+          <a:p>
+            <a:endParaRPr lang="en-CA" dirty="0" smtClean="0"/>
+          </a:p>
+          <a:p>
+            <a:endParaRPr lang="en-CA" dirty="0" smtClean="0"/>
+          </a:p>
+        </p:txBody>
+      </p:sp>
+    </p:spTree>
+    <p:extLst>
+      <p:ext uri="{BB962C8B-B14F-4D97-AF65-F5344CB8AC3E}">
+        <p14:creationId xmlns:p14="http://schemas.microsoft.com/office/powerpoint/2010/main" val="3762617564"/>
+      </p:ext>
+    </p:extLst>
+  </p:cSld>
+  <p:clrMapOvr>
+    <a:masterClrMapping/>
+  </p:clrMapOvr>
+</p:sld>
+</file>
+
+<file path=ppt/slides/slide11.xml><?xml version="1.0" encoding="utf-8"?>
+<p:sld xmlns:a="http://schemas.openxmlformats.org/drawingml/2006/main" xmlns:r="http://schemas.openxmlformats.org/officeDocument/2006/relationships" xmlns:p="http://schemas.openxmlformats.org/presentationml/2006/main">
+  <p:cSld>
+    <p:spTree>
+      <p:nvGrpSpPr>
+        <p:cNvPr id="1" name=""/>
+        <p:cNvGrpSpPr/>
+        <p:nvPr/>
+      </p:nvGrpSpPr>
+      <p:grpSpPr>
+        <a:xfrm>
+          <a:off x="0" y="0"/>
+          <a:ext cx="0" cy="0"/>
+          <a:chOff x="0" y="0"/>
+          <a:chExt cx="0" cy="0"/>
+        </a:xfrm>
+      </p:grpSpPr>
+      <p:sp>
+        <p:nvSpPr>
+          <p:cNvPr id="2" name="Title 1"/>
+          <p:cNvSpPr>
+            <a:spLocks noGrp="1"/>
+          </p:cNvSpPr>
+          <p:nvPr>
+            <p:ph type="title"/>
+          </p:nvPr>
+        </p:nvSpPr>
+        <p:spPr/>
+        <p:txBody>
+          <a:bodyPr/>
+          <a:lstStyle/>
+          <a:p>
+            <a:r>
+              <a:rPr lang="en-CA" dirty="0" err="1" smtClean="0"/>
+              <a:t>DataGridView</a:t>
+            </a:r>
+            <a:r>
+              <a:rPr lang="en-CA" dirty="0" smtClean="0"/>
+              <a:t> Methods</a:t>
+            </a:r>
+            <a:endParaRPr lang="en-CA" dirty="0"/>
+          </a:p>
+        </p:txBody>
+      </p:sp>
+      <p:sp>
+        <p:nvSpPr>
+          <p:cNvPr id="3" name="Content Placeholder 2"/>
+          <p:cNvSpPr>
+            <a:spLocks noGrp="1"/>
+          </p:cNvSpPr>
+          <p:nvPr>
+            <p:ph idx="1"/>
+          </p:nvPr>
+        </p:nvSpPr>
+        <p:spPr>
+          <a:xfrm>
+            <a:off x="4264429" y="2603500"/>
+            <a:ext cx="5651938" cy="3416300"/>
+          </a:xfrm>
+        </p:spPr>
+        <p:txBody>
+          <a:bodyPr/>
+          <a:lstStyle/>
+          <a:p>
+            <a:r>
+              <a:rPr lang="en-CA" dirty="0" smtClean="0"/>
+              <a:t>Top level Helpers will make </a:t>
+            </a:r>
+            <a:r>
+              <a:rPr lang="en-CA" dirty="0" err="1" smtClean="0"/>
+              <a:t>DataGridView</a:t>
+            </a:r>
+            <a:r>
+              <a:rPr lang="en-CA" dirty="0" smtClean="0"/>
+              <a:t> simple to use, even for beginners in LabVIEW</a:t>
+            </a:r>
+          </a:p>
+          <a:p>
+            <a:r>
+              <a:rPr lang="en-CA" dirty="0" smtClean="0"/>
+              <a:t>Basic methods will be made to replicate LabVIEW common table methods</a:t>
+            </a:r>
+          </a:p>
+          <a:p>
+            <a:r>
+              <a:rPr lang="en-CA" dirty="0" smtClean="0"/>
+              <a:t>Advanced methods will enable and configure extra features</a:t>
+            </a:r>
+          </a:p>
+          <a:p>
+            <a:r>
+              <a:rPr lang="en-CA" dirty="0" err="1" smtClean="0"/>
+              <a:t>.net</a:t>
+            </a:r>
+            <a:r>
+              <a:rPr lang="en-CA" dirty="0" smtClean="0"/>
+              <a:t> methods can be used directly as well</a:t>
+            </a:r>
+          </a:p>
+        </p:txBody>
+      </p:sp>
+      <p:pic>
+        <p:nvPicPr>
+          <p:cNvPr id="4" name="Picture 3"/>
+          <p:cNvPicPr>
+            <a:picLocks noChangeAspect="1"/>
+          </p:cNvPicPr>
+          <p:nvPr/>
+        </p:nvPicPr>
+        <p:blipFill>
+          <a:blip r:embed="rId2"/>
+          <a:stretch>
+            <a:fillRect/>
+          </a:stretch>
+        </p:blipFill>
+        <p:spPr>
+          <a:xfrm>
+            <a:off x="1154953" y="5314950"/>
+            <a:ext cx="1819275" cy="704850"/>
+          </a:xfrm>
+          <a:prstGeom prst="rect">
+            <a:avLst/>
+          </a:prstGeom>
+          <a:ln>
+            <a:noFill/>
+          </a:ln>
+          <a:effectLst>
+            <a:outerShdw blurRad="190500" algn="tl" rotWithShape="0">
+              <a:srgbClr val="000000">
+                <a:alpha val="70000"/>
+              </a:srgbClr>
+            </a:outerShdw>
+          </a:effectLst>
+        </p:spPr>
+      </p:pic>
+      <p:pic>
+        <p:nvPicPr>
+          <p:cNvPr id="5" name="Picture 4"/>
+          <p:cNvPicPr>
+            <a:picLocks noChangeAspect="1"/>
+          </p:cNvPicPr>
+          <p:nvPr/>
+        </p:nvPicPr>
+        <p:blipFill>
+          <a:blip r:embed="rId3"/>
+          <a:stretch>
+            <a:fillRect/>
+          </a:stretch>
+        </p:blipFill>
+        <p:spPr>
+          <a:xfrm>
+            <a:off x="1154953" y="2603500"/>
+            <a:ext cx="2714625" cy="1838325"/>
+          </a:xfrm>
+          <a:prstGeom prst="rect">
+            <a:avLst/>
+          </a:prstGeom>
+          <a:ln>
+            <a:noFill/>
+          </a:ln>
+          <a:effectLst>
+            <a:outerShdw blurRad="190500" algn="tl" rotWithShape="0">
+              <a:srgbClr val="000000">
+                <a:alpha val="70000"/>
+              </a:srgbClr>
+            </a:outerShdw>
+          </a:effectLst>
+        </p:spPr>
+      </p:pic>
+    </p:spTree>
+    <p:extLst>
+      <p:ext uri="{BB962C8B-B14F-4D97-AF65-F5344CB8AC3E}">
+        <p14:creationId xmlns:p14="http://schemas.microsoft.com/office/powerpoint/2010/main" val="2867468527"/>
+      </p:ext>
+    </p:extLst>
+  </p:cSld>
+  <p:clrMapOvr>
+    <a:masterClrMapping/>
+  </p:clrMapOvr>
+</p:sld>
+</file>
+
+<file path=ppt/slides/slide12.xml><?xml version="1.0" encoding="utf-8"?>
+<p:sld xmlns:a="http://schemas.openxmlformats.org/drawingml/2006/main" xmlns:r="http://schemas.openxmlformats.org/officeDocument/2006/relationships" xmlns:p="http://schemas.openxmlformats.org/presentationml/2006/main">
+  <p:cSld>
+    <p:spTree>
+      <p:nvGrpSpPr>
+        <p:cNvPr id="1" name=""/>
+        <p:cNvGrpSpPr/>
+        <p:nvPr/>
+      </p:nvGrpSpPr>
+      <p:grpSpPr>
+        <a:xfrm>
+          <a:off x="0" y="0"/>
+          <a:ext cx="0" cy="0"/>
+          <a:chOff x="0" y="0"/>
+          <a:chExt cx="0" cy="0"/>
+        </a:xfrm>
+      </p:grpSpPr>
+      <p:sp>
+        <p:nvSpPr>
+          <p:cNvPr id="2" name="Title 1"/>
+          <p:cNvSpPr>
+            <a:spLocks noGrp="1"/>
+          </p:cNvSpPr>
+          <p:nvPr>
+            <p:ph type="title"/>
+          </p:nvPr>
+        </p:nvSpPr>
+        <p:spPr/>
+        <p:txBody>
+          <a:bodyPr/>
+          <a:lstStyle/>
+          <a:p>
+            <a:r>
+              <a:rPr lang="en-CA" dirty="0" smtClean="0"/>
+              <a:t>Ways to contribute</a:t>
+            </a:r>
+            <a:endParaRPr lang="en-CA" dirty="0"/>
+          </a:p>
+        </p:txBody>
+      </p:sp>
+      <p:sp>
+        <p:nvSpPr>
+          <p:cNvPr id="3" name="Content Placeholder 2"/>
+          <p:cNvSpPr>
+            <a:spLocks noGrp="1"/>
+          </p:cNvSpPr>
+          <p:nvPr>
+            <p:ph idx="1"/>
+          </p:nvPr>
+        </p:nvSpPr>
+        <p:spPr>
+          <a:xfrm>
+            <a:off x="1154955" y="3034144"/>
+            <a:ext cx="5511852" cy="2985655"/>
+          </a:xfrm>
+        </p:spPr>
+        <p:txBody>
+          <a:bodyPr/>
+          <a:lstStyle/>
+          <a:p>
+            <a:pPr>
+              <a:buFont typeface="+mj-lt"/>
+              <a:buAutoNum type="arabicPeriod"/>
+            </a:pPr>
+            <a:r>
+              <a:rPr lang="en-CA" dirty="0" smtClean="0"/>
+              <a:t>Download the </a:t>
+            </a:r>
+            <a:r>
+              <a:rPr lang="en-CA" dirty="0" err="1" smtClean="0"/>
+              <a:t>GridView</a:t>
+            </a:r>
+            <a:r>
+              <a:rPr lang="en-CA" dirty="0" smtClean="0"/>
+              <a:t> and use it, give feedback</a:t>
+            </a:r>
+          </a:p>
+          <a:p>
+            <a:pPr>
+              <a:buFont typeface="+mj-lt"/>
+              <a:buAutoNum type="arabicPeriod"/>
+            </a:pPr>
+            <a:r>
+              <a:rPr lang="en-CA" dirty="0" smtClean="0"/>
+              <a:t>Contribute ideas, issues, and documentation</a:t>
+            </a:r>
+          </a:p>
+          <a:p>
+            <a:pPr>
+              <a:buFont typeface="+mj-lt"/>
+              <a:buAutoNum type="arabicPeriod"/>
+            </a:pPr>
+            <a:r>
+              <a:rPr lang="en-CA" dirty="0" smtClean="0"/>
+              <a:t>Contribute code enhancements, features</a:t>
+            </a:r>
+          </a:p>
+          <a:p>
+            <a:pPr>
+              <a:buFont typeface="+mj-lt"/>
+              <a:buAutoNum type="arabicPeriod"/>
+            </a:pPr>
+            <a:r>
+              <a:rPr lang="en-CA" dirty="0" smtClean="0"/>
+              <a:t>View the </a:t>
+            </a:r>
+            <a:r>
+              <a:rPr lang="en-CA" dirty="0" err="1" smtClean="0"/>
+              <a:t>Github</a:t>
+            </a:r>
+            <a:r>
+              <a:rPr lang="en-CA" dirty="0" smtClean="0"/>
+              <a:t> project’s Todo.md file for more areas to contribute</a:t>
+            </a:r>
+            <a:endParaRPr lang="en-CA" dirty="0"/>
+          </a:p>
+        </p:txBody>
+      </p:sp>
+      <p:pic>
+        <p:nvPicPr>
+          <p:cNvPr id="4" name="Picture 3"/>
+          <p:cNvPicPr>
+            <a:picLocks noChangeAspect="1"/>
+          </p:cNvPicPr>
+          <p:nvPr/>
+        </p:nvPicPr>
+        <p:blipFill>
+          <a:blip r:embed="rId2"/>
+          <a:stretch>
+            <a:fillRect/>
+          </a:stretch>
+        </p:blipFill>
+        <p:spPr>
+          <a:xfrm>
+            <a:off x="7813964" y="806524"/>
+            <a:ext cx="3616035" cy="5735779"/>
+          </a:xfrm>
+          <a:prstGeom prst="rect">
+            <a:avLst/>
+          </a:prstGeom>
+          <a:ln>
+            <a:noFill/>
+          </a:ln>
+          <a:effectLst>
+            <a:outerShdw blurRad="190500" algn="tl" rotWithShape="0">
+              <a:srgbClr val="000000">
+                <a:alpha val="70000"/>
+              </a:srgbClr>
+            </a:outerShdw>
+          </a:effectLst>
+        </p:spPr>
+      </p:pic>
+    </p:spTree>
+    <p:extLst>
+      <p:ext uri="{BB962C8B-B14F-4D97-AF65-F5344CB8AC3E}">
+        <p14:creationId xmlns:p14="http://schemas.microsoft.com/office/powerpoint/2010/main" val="3850885467"/>
+      </p:ext>
+    </p:extLst>
+  </p:cSld>
+  <p:clrMapOvr>
+    <a:masterClrMapping/>
+  </p:clrMapOvr>
+</p:sld>
+</file>
+
+<file path=ppt/slides/slide13.xml><?xml version="1.0" encoding="utf-8"?>
+<p:sld xmlns:a="http://schemas.openxmlformats.org/drawingml/2006/main" xmlns:r="http://schemas.openxmlformats.org/officeDocument/2006/relationships" xmlns:p="http://schemas.openxmlformats.org/presentationml/2006/main">
+  <p:cSld>
+    <p:spTree>
+      <p:nvGrpSpPr>
+        <p:cNvPr id="1" name=""/>
+        <p:cNvGrpSpPr/>
+        <p:nvPr/>
+      </p:nvGrpSpPr>
+      <p:grpSpPr>
+        <a:xfrm>
+          <a:off x="0" y="0"/>
+          <a:ext cx="0" cy="0"/>
+          <a:chOff x="0" y="0"/>
+          <a:chExt cx="0" cy="0"/>
+        </a:xfrm>
+      </p:grpSpPr>
+      <p:sp>
+        <p:nvSpPr>
+          <p:cNvPr id="2" name="Title 1"/>
+          <p:cNvSpPr>
+            <a:spLocks noGrp="1"/>
+          </p:cNvSpPr>
+          <p:nvPr>
+            <p:ph type="title"/>
+          </p:nvPr>
+        </p:nvSpPr>
+        <p:spPr/>
+        <p:txBody>
+          <a:bodyPr/>
+          <a:lstStyle/>
+          <a:p>
+            <a:r>
+              <a:rPr lang="en-CA" dirty="0" smtClean="0"/>
+              <a:t>Contacting Mike</a:t>
+            </a:r>
+            <a:endParaRPr lang="en-CA" dirty="0"/>
+          </a:p>
+        </p:txBody>
+      </p:sp>
+      <p:sp>
+        <p:nvSpPr>
+          <p:cNvPr id="3" name="Content Placeholder 2"/>
+          <p:cNvSpPr>
+            <a:spLocks noGrp="1"/>
+          </p:cNvSpPr>
+          <p:nvPr>
+            <p:ph idx="1"/>
+          </p:nvPr>
+        </p:nvSpPr>
+        <p:spPr/>
+        <p:txBody>
+          <a:bodyPr/>
+          <a:lstStyle/>
+          <a:p>
+            <a:r>
+              <a:rPr lang="en-CA" dirty="0" smtClean="0"/>
+              <a:t>Find him on NI’s forums, user ‘</a:t>
+            </a:r>
+            <a:r>
+              <a:rPr lang="en-CA" dirty="0" err="1" smtClean="0"/>
+              <a:t>Mike_King</a:t>
+            </a:r>
+            <a:r>
+              <a:rPr lang="en-CA" dirty="0" smtClean="0"/>
+              <a:t>’</a:t>
+            </a:r>
+          </a:p>
+          <a:p>
+            <a:r>
+              <a:rPr lang="en-CA" dirty="0" smtClean="0"/>
+              <a:t>Email him at </a:t>
+            </a:r>
+            <a:r>
+              <a:rPr lang="en-CA" dirty="0" smtClean="0">
+                <a:hlinkClick r:id="rId2"/>
+              </a:rPr>
+              <a:t>unipsycho@gmail.com</a:t>
+            </a:r>
+            <a:endParaRPr lang="en-CA" dirty="0" smtClean="0"/>
+          </a:p>
+          <a:p>
+            <a:r>
+              <a:rPr lang="en-CA" dirty="0" err="1" smtClean="0"/>
+              <a:t>Github</a:t>
+            </a:r>
+            <a:r>
+              <a:rPr lang="en-CA" dirty="0" smtClean="0"/>
+              <a:t>:  </a:t>
+            </a:r>
+            <a:r>
+              <a:rPr lang="en-CA" dirty="0" smtClean="0">
+                <a:hlinkClick r:id="rId3"/>
+              </a:rPr>
+              <a:t>http://github.com/unipsycho</a:t>
+            </a:r>
+            <a:endParaRPr lang="en-CA" dirty="0" smtClean="0"/>
+          </a:p>
+          <a:p>
+            <a:endParaRPr lang="en-CA" dirty="0"/>
+          </a:p>
+          <a:p>
+            <a:r>
+              <a:rPr lang="en-CA" dirty="0" smtClean="0"/>
+              <a:t>@</a:t>
+            </a:r>
+            <a:r>
+              <a:rPr lang="en-CA" dirty="0" err="1" smtClean="0"/>
+              <a:t>Prolucid</a:t>
+            </a:r>
+            <a:r>
+              <a:rPr lang="en-CA" dirty="0" smtClean="0"/>
+              <a:t>:   </a:t>
+            </a:r>
+            <a:r>
+              <a:rPr lang="en-CA" dirty="0" smtClean="0">
+                <a:hlinkClick r:id="rId4"/>
+              </a:rPr>
+              <a:t>mike.king@prolucid.ca</a:t>
+            </a:r>
+            <a:endParaRPr lang="en-CA" dirty="0" smtClean="0"/>
+          </a:p>
+        </p:txBody>
+      </p:sp>
+    </p:spTree>
+    <p:extLst>
+      <p:ext uri="{BB962C8B-B14F-4D97-AF65-F5344CB8AC3E}">
+        <p14:creationId xmlns:p14="http://schemas.microsoft.com/office/powerpoint/2010/main" val="4221115722"/>
+      </p:ext>
+    </p:extLst>
+  </p:cSld>
+  <p:clrMapOvr>
+    <a:masterClrMapping/>
+  </p:clrMapOvr>
+</p:sld>
+</file>
+
+<file path=ppt/slides/slide14.xml><?xml version="1.0" encoding="utf-8"?>
+<p:sld xmlns:a="http://schemas.openxmlformats.org/drawingml/2006/main" xmlns:r="http://schemas.openxmlformats.org/officeDocument/2006/relationships" xmlns:p="http://schemas.openxmlformats.org/presentationml/2006/main">
+  <p:cSld>
+    <p:spTree>
+      <p:nvGrpSpPr>
+        <p:cNvPr id="1" name=""/>
+        <p:cNvGrpSpPr/>
+        <p:nvPr/>
+      </p:nvGrpSpPr>
+      <p:grpSpPr>
+        <a:xfrm>
+          <a:off x="0" y="0"/>
+          <a:ext cx="0" cy="0"/>
+          <a:chOff x="0" y="0"/>
+          <a:chExt cx="0" cy="0"/>
+        </a:xfrm>
+      </p:grpSpPr>
+      <p:sp>
+        <p:nvSpPr>
+          <p:cNvPr id="2" name="Title 1"/>
+          <p:cNvSpPr>
+            <a:spLocks noGrp="1"/>
+          </p:cNvSpPr>
+          <p:nvPr>
+            <p:ph type="title"/>
+          </p:nvPr>
+        </p:nvSpPr>
+        <p:spPr/>
+        <p:txBody>
+          <a:bodyPr/>
+          <a:lstStyle/>
+          <a:p>
+            <a:r>
+              <a:rPr lang="en-CA" dirty="0" smtClean="0"/>
+              <a:t>Resources</a:t>
+            </a:r>
+            <a:endParaRPr lang="en-CA" dirty="0"/>
+          </a:p>
+        </p:txBody>
+      </p:sp>
+      <p:sp>
+        <p:nvSpPr>
+          <p:cNvPr id="3" name="Content Placeholder 2"/>
+          <p:cNvSpPr>
+            <a:spLocks noGrp="1"/>
+          </p:cNvSpPr>
+          <p:nvPr>
+            <p:ph idx="1"/>
+          </p:nvPr>
+        </p:nvSpPr>
+        <p:spPr/>
+        <p:txBody>
+          <a:bodyPr/>
+          <a:lstStyle/>
+          <a:p>
+            <a:r>
+              <a:rPr lang="en-CA" dirty="0" smtClean="0"/>
+              <a:t>GitHub Source Code</a:t>
+            </a:r>
+          </a:p>
+          <a:p>
+            <a:pPr lvl="1"/>
+            <a:r>
+              <a:rPr lang="en-CA" dirty="0" smtClean="0">
+                <a:hlinkClick r:id="rId2"/>
+              </a:rPr>
+              <a:t>https</a:t>
+            </a:r>
+            <a:r>
+              <a:rPr lang="en-CA" dirty="0">
+                <a:hlinkClick r:id="rId2"/>
+              </a:rPr>
+              <a:t>://</a:t>
+            </a:r>
+            <a:r>
+              <a:rPr lang="en-CA" dirty="0" smtClean="0">
+                <a:hlinkClick r:id="rId2"/>
+              </a:rPr>
+              <a:t>github.com/unipsycho/LabVIEWdotNetDataGrid</a:t>
+            </a:r>
+            <a:endParaRPr lang="en-CA" dirty="0" smtClean="0"/>
+          </a:p>
+          <a:p>
+            <a:pPr lvl="1"/>
+            <a:endParaRPr lang="en-CA" dirty="0"/>
+          </a:p>
+          <a:p>
+            <a:r>
+              <a:rPr lang="en-CA" dirty="0" smtClean="0"/>
+              <a:t>Discussion Forums</a:t>
+            </a:r>
+          </a:p>
+          <a:p>
+            <a:pPr lvl="1"/>
+            <a:r>
+              <a:rPr lang="en-CA" dirty="0">
+                <a:hlinkClick r:id="rId3"/>
+              </a:rPr>
+              <a:t>http://</a:t>
+            </a:r>
+            <a:r>
+              <a:rPr lang="en-CA" dirty="0" smtClean="0">
+                <a:hlinkClick r:id="rId3"/>
+              </a:rPr>
+              <a:t>forums.ni.com/t5/LabVIEW/OpenSource-Project-for-a-NET-Datagrid-for-LabVIEW/m-p/3205078#M929642</a:t>
+            </a:r>
+            <a:endParaRPr lang="en-CA" dirty="0" smtClean="0"/>
+          </a:p>
+          <a:p>
+            <a:pPr lvl="1"/>
+            <a:r>
+              <a:rPr lang="en-CA" dirty="0">
+                <a:hlinkClick r:id="rId4"/>
+              </a:rPr>
+              <a:t>https://lavag.org/topic/19274-full-datagridview-for-labview-open-source-project-underway</a:t>
+            </a:r>
+            <a:r>
+              <a:rPr lang="en-CA" dirty="0" smtClean="0">
+                <a:hlinkClick r:id="rId4"/>
+              </a:rPr>
+              <a:t>/</a:t>
+            </a:r>
+            <a:endParaRPr lang="en-CA" dirty="0" smtClean="0"/>
+          </a:p>
+        </p:txBody>
+      </p:sp>
+    </p:spTree>
+    <p:extLst>
+      <p:ext uri="{BB962C8B-B14F-4D97-AF65-F5344CB8AC3E}">
+        <p14:creationId xmlns:p14="http://schemas.microsoft.com/office/powerpoint/2010/main" val="3904023971"/>
       </p:ext>
     </p:extLst>
   </p:cSld>
@@ -13978,7 +14988,7 @@
           <a:p>
             <a:r>
               <a:rPr lang="en-CA" dirty="0" smtClean="0"/>
-              <a:t>Project Reason and Purpose</a:t>
+              <a:t>About Mike</a:t>
             </a:r>
             <a:endParaRPr lang="en-CA" dirty="0"/>
           </a:p>
@@ -13994,62 +15004,393 @@
             <p:ph idx="1"/>
           </p:nvPr>
         </p:nvSpPr>
-        <p:spPr/>
+        <p:spPr>
+          <a:xfrm>
+            <a:off x="396197" y="2409825"/>
+            <a:ext cx="3509000" cy="4140604"/>
+          </a:xfrm>
+        </p:spPr>
         <p:txBody>
-          <a:bodyPr/>
+          <a:bodyPr>
+            <a:normAutofit/>
+          </a:bodyPr>
           <a:lstStyle/>
           <a:p>
             <a:r>
               <a:rPr lang="en-CA" dirty="0" smtClean="0"/>
-              <a:t>LabVIEW’s Tables are very limited</a:t>
-            </a:r>
-          </a:p>
-          <a:p>
-            <a:r>
-              <a:rPr lang="en-CA" dirty="0" err="1" smtClean="0"/>
-              <a:t>DataGrids</a:t>
-            </a:r>
+              <a:t>Led and built teams &amp; innovation within product development groups </a:t>
+            </a:r>
+          </a:p>
+          <a:p>
             <a:r>
               <a:rPr lang="en-CA" dirty="0" smtClean="0"/>
-              <a:t> are a proven excellent solution for tabular data</a:t>
+              <a:t>Technical expertise in LabVIEW, C# and Web systems for over 15 years</a:t>
             </a:r>
           </a:p>
           <a:p>
             <a:r>
               <a:rPr lang="en-CA" dirty="0" smtClean="0"/>
-              <a:t>.NET has a great </a:t>
-            </a:r>
-            <a:r>
-              <a:rPr lang="en-CA" dirty="0" err="1" smtClean="0"/>
-              <a:t>DataGridView</a:t>
-            </a:r>
+              <a:t>Architected platforms in instrumentation, controls and automation</a:t>
+            </a:r>
+          </a:p>
+          <a:p>
             <a:r>
               <a:rPr lang="en-CA" dirty="0" smtClean="0"/>
-              <a:t> component</a:t>
-            </a:r>
-          </a:p>
-          <a:p>
-            <a:r>
-              <a:rPr lang="en-CA" dirty="0" smtClean="0"/>
-              <a:t>.NET containers in LabVIEW are fast and integrate well</a:t>
-            </a:r>
-          </a:p>
-          <a:p>
-            <a:endParaRPr lang="en-CA" dirty="0"/>
-          </a:p>
-          <a:p>
-            <a:r>
-              <a:rPr lang="en-CA" dirty="0" smtClean="0"/>
-              <a:t>Purpose is to therefore, provide a LabVIEW Table replacement with more capabilities that is much easier to use (by both developers and end users) than the native table.</a:t>
-            </a:r>
+              <a:t>System integration of LabVIEW with web tools, HTML, and Database Systems</a:t>
+            </a:r>
+          </a:p>
+          <a:p>
             <a:endParaRPr lang="en-CA" dirty="0"/>
           </a:p>
         </p:txBody>
       </p:sp>
+      <p:sp>
+        <p:nvSpPr>
+          <p:cNvPr id="5" name="Content Placeholder 2"/>
+          <p:cNvSpPr txBox="1">
+            <a:spLocks/>
+          </p:cNvSpPr>
+          <p:nvPr/>
+        </p:nvSpPr>
+        <p:spPr>
+          <a:xfrm>
+            <a:off x="5458121" y="399012"/>
+            <a:ext cx="4688892" cy="3522518"/>
+          </a:xfrm>
+          <a:prstGeom prst="rect">
+            <a:avLst/>
+          </a:prstGeom>
+          <a:solidFill>
+            <a:schemeClr val="bg1"/>
+          </a:solidFill>
+        </p:spPr>
+        <p:txBody>
+          <a:bodyPr vert="horz" lIns="91440" tIns="45720" rIns="91440" bIns="45720" rtlCol="0">
+            <a:normAutofit/>
+          </a:bodyPr>
+          <a:lstStyle>
+            <a:lvl1pPr marL="342900" indent="-342900" algn="l" defTabSz="457200" rtl="0" eaLnBrk="1" latinLnBrk="0" hangingPunct="1">
+              <a:spcBef>
+                <a:spcPts val="1000"/>
+              </a:spcBef>
+              <a:spcAft>
+                <a:spcPts val="0"/>
+              </a:spcAft>
+              <a:buClr>
+                <a:schemeClr val="accent1"/>
+              </a:buClr>
+              <a:buSzPct val="80000"/>
+              <a:buFont typeface="Wingdings 3" charset="2"/>
+              <a:buChar char=""/>
+              <a:defRPr sz="1800" b="0" i="0" kern="1200">
+                <a:solidFill>
+                  <a:schemeClr val="tx1">
+                    <a:lumMod val="75000"/>
+                    <a:lumOff val="25000"/>
+                  </a:schemeClr>
+                </a:solidFill>
+                <a:latin typeface="+mn-lt"/>
+                <a:ea typeface="+mn-ea"/>
+                <a:cs typeface="+mn-cs"/>
+              </a:defRPr>
+            </a:lvl1pPr>
+            <a:lvl2pPr marL="742950" indent="-285750" algn="l" defTabSz="457200" rtl="0" eaLnBrk="1" latinLnBrk="0" hangingPunct="1">
+              <a:spcBef>
+                <a:spcPts val="1000"/>
+              </a:spcBef>
+              <a:spcAft>
+                <a:spcPts val="0"/>
+              </a:spcAft>
+              <a:buClr>
+                <a:schemeClr val="accent1"/>
+              </a:buClr>
+              <a:buSzPct val="80000"/>
+              <a:buFont typeface="Wingdings 3" charset="2"/>
+              <a:buChar char=""/>
+              <a:defRPr sz="1600" b="0" i="0" kern="1200">
+                <a:solidFill>
+                  <a:schemeClr val="tx1">
+                    <a:lumMod val="75000"/>
+                    <a:lumOff val="25000"/>
+                  </a:schemeClr>
+                </a:solidFill>
+                <a:latin typeface="+mn-lt"/>
+                <a:ea typeface="+mn-ea"/>
+                <a:cs typeface="+mn-cs"/>
+              </a:defRPr>
+            </a:lvl2pPr>
+            <a:lvl3pPr marL="1143000" indent="-228600" algn="l" defTabSz="457200" rtl="0" eaLnBrk="1" latinLnBrk="0" hangingPunct="1">
+              <a:spcBef>
+                <a:spcPts val="1000"/>
+              </a:spcBef>
+              <a:spcAft>
+                <a:spcPts val="0"/>
+              </a:spcAft>
+              <a:buClr>
+                <a:schemeClr val="accent1"/>
+              </a:buClr>
+              <a:buSzPct val="80000"/>
+              <a:buFont typeface="Wingdings 3" charset="2"/>
+              <a:buChar char=""/>
+              <a:defRPr sz="1400" b="0" i="0" kern="1200">
+                <a:solidFill>
+                  <a:schemeClr val="tx1">
+                    <a:lumMod val="75000"/>
+                    <a:lumOff val="25000"/>
+                  </a:schemeClr>
+                </a:solidFill>
+                <a:latin typeface="+mn-lt"/>
+                <a:ea typeface="+mn-ea"/>
+                <a:cs typeface="+mn-cs"/>
+              </a:defRPr>
+            </a:lvl3pPr>
+            <a:lvl4pPr marL="1600200" indent="-228600" algn="l" defTabSz="457200" rtl="0" eaLnBrk="1" latinLnBrk="0" hangingPunct="1">
+              <a:spcBef>
+                <a:spcPts val="1000"/>
+              </a:spcBef>
+              <a:spcAft>
+                <a:spcPts val="0"/>
+              </a:spcAft>
+              <a:buClr>
+                <a:schemeClr val="accent1"/>
+              </a:buClr>
+              <a:buSzPct val="80000"/>
+              <a:buFont typeface="Wingdings 3" charset="2"/>
+              <a:buChar char=""/>
+              <a:defRPr sz="1200" b="0" i="0" kern="1200">
+                <a:solidFill>
+                  <a:schemeClr val="tx1">
+                    <a:lumMod val="75000"/>
+                    <a:lumOff val="25000"/>
+                  </a:schemeClr>
+                </a:solidFill>
+                <a:latin typeface="+mn-lt"/>
+                <a:ea typeface="+mn-ea"/>
+                <a:cs typeface="+mn-cs"/>
+              </a:defRPr>
+            </a:lvl4pPr>
+            <a:lvl5pPr marL="2057400" indent="-228600" algn="l" defTabSz="457200" rtl="0" eaLnBrk="1" latinLnBrk="0" hangingPunct="1">
+              <a:spcBef>
+                <a:spcPts val="1000"/>
+              </a:spcBef>
+              <a:spcAft>
+                <a:spcPts val="0"/>
+              </a:spcAft>
+              <a:buClr>
+                <a:schemeClr val="accent1"/>
+              </a:buClr>
+              <a:buSzPct val="80000"/>
+              <a:buFont typeface="Wingdings 3" charset="2"/>
+              <a:buChar char=""/>
+              <a:defRPr sz="1200" b="0" i="0" kern="1200">
+                <a:solidFill>
+                  <a:schemeClr val="tx1">
+                    <a:lumMod val="75000"/>
+                    <a:lumOff val="25000"/>
+                  </a:schemeClr>
+                </a:solidFill>
+                <a:latin typeface="+mn-lt"/>
+                <a:ea typeface="+mn-ea"/>
+                <a:cs typeface="+mn-cs"/>
+              </a:defRPr>
+            </a:lvl5pPr>
+            <a:lvl6pPr marL="2514600" indent="-228600" algn="l" defTabSz="457200" rtl="0" eaLnBrk="1" latinLnBrk="0" hangingPunct="1">
+              <a:spcBef>
+                <a:spcPts val="1000"/>
+              </a:spcBef>
+              <a:spcAft>
+                <a:spcPts val="0"/>
+              </a:spcAft>
+              <a:buClr>
+                <a:schemeClr val="accent1"/>
+              </a:buClr>
+              <a:buSzPct val="80000"/>
+              <a:buFont typeface="Wingdings 3" charset="2"/>
+              <a:buChar char=""/>
+              <a:defRPr sz="1200" b="0" i="0" kern="1200">
+                <a:solidFill>
+                  <a:schemeClr val="tx1">
+                    <a:lumMod val="75000"/>
+                    <a:lumOff val="25000"/>
+                  </a:schemeClr>
+                </a:solidFill>
+                <a:latin typeface="+mn-lt"/>
+                <a:ea typeface="+mn-ea"/>
+                <a:cs typeface="+mn-cs"/>
+              </a:defRPr>
+            </a:lvl6pPr>
+            <a:lvl7pPr marL="2971800" indent="-228600" algn="l" defTabSz="457200" rtl="0" eaLnBrk="1" latinLnBrk="0" hangingPunct="1">
+              <a:spcBef>
+                <a:spcPts val="1000"/>
+              </a:spcBef>
+              <a:spcAft>
+                <a:spcPts val="0"/>
+              </a:spcAft>
+              <a:buClr>
+                <a:schemeClr val="accent1"/>
+              </a:buClr>
+              <a:buSzPct val="80000"/>
+              <a:buFont typeface="Wingdings 3" charset="2"/>
+              <a:buChar char=""/>
+              <a:defRPr sz="1200" b="0" i="0" kern="1200">
+                <a:solidFill>
+                  <a:schemeClr val="tx1">
+                    <a:lumMod val="75000"/>
+                    <a:lumOff val="25000"/>
+                  </a:schemeClr>
+                </a:solidFill>
+                <a:latin typeface="+mn-lt"/>
+                <a:ea typeface="+mn-ea"/>
+                <a:cs typeface="+mn-cs"/>
+              </a:defRPr>
+            </a:lvl7pPr>
+            <a:lvl8pPr marL="3429000" indent="-228600" algn="l" defTabSz="457200" rtl="0" eaLnBrk="1" latinLnBrk="0" hangingPunct="1">
+              <a:spcBef>
+                <a:spcPts val="1000"/>
+              </a:spcBef>
+              <a:spcAft>
+                <a:spcPts val="0"/>
+              </a:spcAft>
+              <a:buClr>
+                <a:schemeClr val="accent1"/>
+              </a:buClr>
+              <a:buSzPct val="80000"/>
+              <a:buFont typeface="Wingdings 3" charset="2"/>
+              <a:buChar char=""/>
+              <a:defRPr sz="1200" b="0" i="0" kern="1200">
+                <a:solidFill>
+                  <a:schemeClr val="tx1">
+                    <a:lumMod val="75000"/>
+                    <a:lumOff val="25000"/>
+                  </a:schemeClr>
+                </a:solidFill>
+                <a:latin typeface="+mn-lt"/>
+                <a:ea typeface="+mn-ea"/>
+                <a:cs typeface="+mn-cs"/>
+              </a:defRPr>
+            </a:lvl8pPr>
+            <a:lvl9pPr marL="3886200" indent="-228600" algn="l" defTabSz="457200" rtl="0" eaLnBrk="1" latinLnBrk="0" hangingPunct="1">
+              <a:spcBef>
+                <a:spcPts val="1000"/>
+              </a:spcBef>
+              <a:spcAft>
+                <a:spcPts val="0"/>
+              </a:spcAft>
+              <a:buClr>
+                <a:schemeClr val="accent1"/>
+              </a:buClr>
+              <a:buSzPct val="80000"/>
+              <a:buFont typeface="Wingdings 3" charset="2"/>
+              <a:buChar char=""/>
+              <a:defRPr sz="1200" b="0" i="0" kern="1200">
+                <a:solidFill>
+                  <a:schemeClr val="tx1">
+                    <a:lumMod val="75000"/>
+                    <a:lumOff val="25000"/>
+                  </a:schemeClr>
+                </a:solidFill>
+                <a:latin typeface="+mn-lt"/>
+                <a:ea typeface="+mn-ea"/>
+                <a:cs typeface="+mn-cs"/>
+              </a:defRPr>
+            </a:lvl9pPr>
+          </a:lstStyle>
+          <a:p>
+            <a:endParaRPr lang="en-CA" dirty="0" smtClean="0"/>
+          </a:p>
+          <a:p>
+            <a:r>
+              <a:rPr lang="en-CA" dirty="0" smtClean="0"/>
+              <a:t>Mike’s currently working for </a:t>
+            </a:r>
+            <a:r>
+              <a:rPr lang="en-CA" dirty="0" err="1" smtClean="0"/>
+              <a:t>Prolucid</a:t>
+            </a:r>
+            <a:endParaRPr lang="en-CA" dirty="0" smtClean="0"/>
+          </a:p>
+          <a:p>
+            <a:endParaRPr lang="en-CA" dirty="0"/>
+          </a:p>
+        </p:txBody>
+      </p:sp>
+      <p:pic>
+        <p:nvPicPr>
+          <p:cNvPr id="4" name="Picture 3"/>
+          <p:cNvPicPr>
+            <a:picLocks noChangeAspect="1"/>
+          </p:cNvPicPr>
+          <p:nvPr/>
+        </p:nvPicPr>
+        <p:blipFill>
+          <a:blip r:embed="rId2"/>
+          <a:stretch>
+            <a:fillRect/>
+          </a:stretch>
+        </p:blipFill>
+        <p:spPr>
+          <a:xfrm>
+            <a:off x="4507129" y="2116111"/>
+            <a:ext cx="6834713" cy="4434318"/>
+          </a:xfrm>
+          <a:prstGeom prst="rect">
+            <a:avLst/>
+          </a:prstGeom>
+          <a:ln>
+            <a:noFill/>
+          </a:ln>
+          <a:effectLst>
+            <a:outerShdw blurRad="190500" algn="tl" rotWithShape="0">
+              <a:srgbClr val="000000">
+                <a:alpha val="70000"/>
+              </a:srgbClr>
+            </a:outerShdw>
+          </a:effectLst>
+        </p:spPr>
+      </p:pic>
+      <p:pic>
+        <p:nvPicPr>
+          <p:cNvPr id="1026" name="Picture 2" descr="https://media.glassdoor.com/sqll/816302/prolucid-squarelogo-1423870036794.png"/>
+          <p:cNvPicPr>
+            <a:picLocks noChangeAspect="1" noChangeArrowheads="1"/>
+          </p:cNvPicPr>
+          <p:nvPr/>
+        </p:nvPicPr>
+        <p:blipFill rotWithShape="1">
+          <a:blip r:embed="rId3">
+            <a:extLst>
+              <a:ext uri="{28A0092B-C50C-407E-A947-70E740481C1C}">
+                <a14:useLocalDpi xmlns:a14="http://schemas.microsoft.com/office/drawing/2010/main" val="0"/>
+              </a:ext>
+            </a:extLst>
+          </a:blip>
+          <a:srcRect t="37555" b="31945"/>
+          <a:stretch/>
+        </p:blipFill>
+        <p:spPr bwMode="auto">
+          <a:xfrm>
+            <a:off x="6850067" y="1325054"/>
+            <a:ext cx="1905000" cy="581026"/>
+          </a:xfrm>
+          <a:prstGeom prst="rect">
+            <a:avLst/>
+          </a:prstGeom>
+          <a:noFill/>
+          <a:extLst>
+            <a:ext uri="{909E8E84-426E-40DD-AFC4-6F175D3DCCD1}">
+              <a14:hiddenFill xmlns:a14="http://schemas.microsoft.com/office/drawing/2010/main">
+                <a:solidFill>
+                  <a:srgbClr val="FFFFFF"/>
+                </a:solidFill>
+              </a14:hiddenFill>
+            </a:ext>
+          </a:extLst>
+        </p:spPr>
+      </p:pic>
     </p:spTree>
     <p:extLst>
       <p:ext uri="{BB962C8B-B14F-4D97-AF65-F5344CB8AC3E}">
-        <p14:creationId xmlns:p14="http://schemas.microsoft.com/office/powerpoint/2010/main" val="204072907"/>
+        <p14:creationId xmlns:p14="http://schemas.microsoft.com/office/powerpoint/2010/main" val="3038266223"/>
       </p:ext>
     </p:extLst>
   </p:cSld>
@@ -14093,7 +15434,7 @@
           <a:p>
             <a:r>
               <a:rPr lang="en-CA" dirty="0" smtClean="0"/>
-              <a:t>LabVIEW Tables	</a:t>
+              <a:t>Project Reason and Purpose</a:t>
             </a:r>
             <a:endParaRPr lang="en-CA" dirty="0"/>
           </a:p>
@@ -14109,117 +15450,62 @@
             <p:ph idx="1"/>
           </p:nvPr>
         </p:nvSpPr>
-        <p:spPr>
-          <a:xfrm>
-            <a:off x="1154955" y="2603499"/>
-            <a:ext cx="8761412" cy="3813925"/>
-          </a:xfrm>
-        </p:spPr>
+        <p:spPr/>
         <p:txBody>
-          <a:bodyPr>
-            <a:normAutofit/>
-          </a:bodyPr>
+          <a:bodyPr/>
           <a:lstStyle/>
           <a:p>
-            <a:pPr marL="0" indent="0">
-              <a:buNone/>
-            </a:pPr>
-            <a:r>
-              <a:rPr lang="en-CA" sz="2400" dirty="0" smtClean="0">
-                <a:solidFill>
-                  <a:srgbClr val="FF0000"/>
-                </a:solidFill>
-              </a:rPr>
-              <a:t>Forced to Implement Manually</a:t>
-            </a:r>
-          </a:p>
-          <a:p>
             <a:r>
               <a:rPr lang="en-CA" dirty="0" smtClean="0"/>
-              <a:t>Additional cell data types</a:t>
-            </a:r>
-          </a:p>
-          <a:p>
+              <a:t>LabVIEW’s Tables are very limited</a:t>
+            </a:r>
+          </a:p>
+          <a:p>
+            <a:r>
+              <a:rPr lang="en-CA" dirty="0" err="1" smtClean="0"/>
+              <a:t>DataGrids</a:t>
+            </a:r>
             <a:r>
               <a:rPr lang="en-CA" dirty="0" smtClean="0"/>
-              <a:t>No word wrapping</a:t>
+              <a:t> are a proven excellent solution for tabular data</a:t>
             </a:r>
           </a:p>
           <a:p>
             <a:r>
               <a:rPr lang="en-CA" dirty="0" smtClean="0"/>
-              <a:t>Auto column resizing</a:t>
-            </a:r>
-          </a:p>
-          <a:p>
+              <a:t>.NET has a great </a:t>
+            </a:r>
+            <a:r>
+              <a:rPr lang="en-CA" dirty="0" err="1" smtClean="0"/>
+              <a:t>DataGridView</a:t>
+            </a:r>
             <a:r>
               <a:rPr lang="en-CA" dirty="0" smtClean="0"/>
-              <a:t>Cell text wrapping</a:t>
+              <a:t> component</a:t>
             </a:r>
           </a:p>
           <a:p>
             <a:r>
               <a:rPr lang="en-CA" dirty="0" smtClean="0"/>
-              <a:t>Column sorts and filters</a:t>
-            </a:r>
-          </a:p>
-          <a:p>
-            <a:endParaRPr lang="en-CA" dirty="0" smtClean="0"/>
+              <a:t>.NET containers in LabVIEW are fast and integrate well</a:t>
+            </a:r>
           </a:p>
           <a:p>
             <a:endParaRPr lang="en-CA" dirty="0"/>
           </a:p>
           <a:p>
-            <a:pPr marL="0" indent="0">
-              <a:buNone/>
-            </a:pPr>
-            <a:r>
-              <a:rPr lang="en-CA" dirty="0" smtClean="0">
-                <a:solidFill>
-                  <a:srgbClr val="FF0000"/>
-                </a:solidFill>
-              </a:rPr>
-              <a:t>All these are native to </a:t>
-            </a:r>
-            <a:r>
-              <a:rPr lang="en-CA" dirty="0" err="1" smtClean="0">
-                <a:solidFill>
-                  <a:srgbClr val="FF0000"/>
-                </a:solidFill>
-              </a:rPr>
-              <a:t>.Net</a:t>
-            </a:r>
-            <a:r>
-              <a:rPr lang="en-CA" dirty="0" smtClean="0">
-                <a:solidFill>
-                  <a:srgbClr val="FF0000"/>
-                </a:solidFill>
-              </a:rPr>
-              <a:t> </a:t>
-            </a:r>
-            <a:r>
-              <a:rPr lang="en-CA" dirty="0" err="1" smtClean="0">
-                <a:solidFill>
-                  <a:srgbClr val="FF0000"/>
-                </a:solidFill>
-              </a:rPr>
-              <a:t>DataGridView</a:t>
-            </a:r>
-            <a:r>
-              <a:rPr lang="en-CA" dirty="0" smtClean="0">
-                <a:solidFill>
-                  <a:srgbClr val="FF0000"/>
-                </a:solidFill>
-              </a:rPr>
-              <a:t>, no custom programming</a:t>
-            </a:r>
+            <a:r>
+              <a:rPr lang="en-CA" dirty="0" smtClean="0"/>
+              <a:t>Purpose is to therefore, provide a LabVIEW Table replacement with more capabilities that is much easier to use (by both developers and end users) than the native table.</a:t>
+            </a:r>
+            <a:endParaRPr lang="en-CA" dirty="0"/>
           </a:p>
         </p:txBody>
       </p:sp>
     </p:spTree>
     <p:extLst>
       <p:ext uri="{BB962C8B-B14F-4D97-AF65-F5344CB8AC3E}">
-        <p14:creationId xmlns:p14="http://schemas.microsoft.com/office/powerpoint/2010/main" val="2635264503"/>
+        <p14:creationId xmlns:p14="http://schemas.microsoft.com/office/powerpoint/2010/main" val="204072907"/>
       </p:ext>
     </p:extLst>
   </p:cSld>
@@ -14263,6 +15549,176 @@
           <a:p>
             <a:r>
               <a:rPr lang="en-CA" dirty="0" smtClean="0"/>
+              <a:t>LabVIEW Tables	</a:t>
+            </a:r>
+            <a:endParaRPr lang="en-CA" dirty="0"/>
+          </a:p>
+        </p:txBody>
+      </p:sp>
+      <p:sp>
+        <p:nvSpPr>
+          <p:cNvPr id="3" name="Content Placeholder 2"/>
+          <p:cNvSpPr>
+            <a:spLocks noGrp="1"/>
+          </p:cNvSpPr>
+          <p:nvPr>
+            <p:ph idx="1"/>
+          </p:nvPr>
+        </p:nvSpPr>
+        <p:spPr>
+          <a:xfrm>
+            <a:off x="1154955" y="2603499"/>
+            <a:ext cx="8761412" cy="3813925"/>
+          </a:xfrm>
+        </p:spPr>
+        <p:txBody>
+          <a:bodyPr>
+            <a:normAutofit/>
+          </a:bodyPr>
+          <a:lstStyle/>
+          <a:p>
+            <a:pPr marL="0" indent="0">
+              <a:buNone/>
+            </a:pPr>
+            <a:r>
+              <a:rPr lang="en-CA" sz="2400" dirty="0" smtClean="0">
+                <a:solidFill>
+                  <a:srgbClr val="FF0000"/>
+                </a:solidFill>
+              </a:rPr>
+              <a:t>Forced to Implement Manually</a:t>
+            </a:r>
+          </a:p>
+          <a:p>
+            <a:r>
+              <a:rPr lang="en-CA" dirty="0" smtClean="0"/>
+              <a:t>Additional cell data types</a:t>
+            </a:r>
+          </a:p>
+          <a:p>
+            <a:r>
+              <a:rPr lang="en-CA" dirty="0" smtClean="0"/>
+              <a:t>No word wrapping</a:t>
+            </a:r>
+          </a:p>
+          <a:p>
+            <a:r>
+              <a:rPr lang="en-CA" dirty="0" smtClean="0"/>
+              <a:t>Auto column resizing</a:t>
+            </a:r>
+          </a:p>
+          <a:p>
+            <a:r>
+              <a:rPr lang="en-CA" dirty="0" smtClean="0"/>
+              <a:t>Cell text wrapping</a:t>
+            </a:r>
+          </a:p>
+          <a:p>
+            <a:r>
+              <a:rPr lang="en-CA" dirty="0" smtClean="0"/>
+              <a:t>Column sorts and filters</a:t>
+            </a:r>
+          </a:p>
+          <a:p>
+            <a:endParaRPr lang="en-CA" dirty="0" smtClean="0"/>
+          </a:p>
+          <a:p>
+            <a:endParaRPr lang="en-CA" dirty="0"/>
+          </a:p>
+          <a:p>
+            <a:pPr marL="0" indent="0">
+              <a:buNone/>
+            </a:pPr>
+            <a:r>
+              <a:rPr lang="en-CA" dirty="0" smtClean="0">
+                <a:solidFill>
+                  <a:srgbClr val="FF0000"/>
+                </a:solidFill>
+              </a:rPr>
+              <a:t>All these are native to </a:t>
+            </a:r>
+            <a:r>
+              <a:rPr lang="en-CA" dirty="0" err="1" smtClean="0">
+                <a:solidFill>
+                  <a:srgbClr val="FF0000"/>
+                </a:solidFill>
+              </a:rPr>
+              <a:t>.Net</a:t>
+            </a:r>
+            <a:r>
+              <a:rPr lang="en-CA" dirty="0" smtClean="0">
+                <a:solidFill>
+                  <a:srgbClr val="FF0000"/>
+                </a:solidFill>
+              </a:rPr>
+              <a:t> </a:t>
+            </a:r>
+            <a:r>
+              <a:rPr lang="en-CA" dirty="0" err="1" smtClean="0">
+                <a:solidFill>
+                  <a:srgbClr val="FF0000"/>
+                </a:solidFill>
+              </a:rPr>
+              <a:t>DataGridView</a:t>
+            </a:r>
+            <a:r>
+              <a:rPr lang="en-CA" dirty="0" smtClean="0">
+                <a:solidFill>
+                  <a:srgbClr val="FF0000"/>
+                </a:solidFill>
+              </a:rPr>
+              <a:t>, no custom programming</a:t>
+            </a:r>
+          </a:p>
+        </p:txBody>
+      </p:sp>
+    </p:spTree>
+    <p:extLst>
+      <p:ext uri="{BB962C8B-B14F-4D97-AF65-F5344CB8AC3E}">
+        <p14:creationId xmlns:p14="http://schemas.microsoft.com/office/powerpoint/2010/main" val="2635264503"/>
+      </p:ext>
+    </p:extLst>
+  </p:cSld>
+  <p:clrMapOvr>
+    <a:masterClrMapping/>
+  </p:clrMapOvr>
+</p:sld>
+</file>
+
+<file path=ppt/slides/slide5.xml><?xml version="1.0" encoding="utf-8"?>
+<p:sld xmlns:a="http://schemas.openxmlformats.org/drawingml/2006/main" xmlns:r="http://schemas.openxmlformats.org/officeDocument/2006/relationships" xmlns:p="http://schemas.openxmlformats.org/presentationml/2006/main">
+  <p:cSld>
+    <p:spTree>
+      <p:nvGrpSpPr>
+        <p:cNvPr id="1" name=""/>
+        <p:cNvGrpSpPr/>
+        <p:nvPr/>
+      </p:nvGrpSpPr>
+      <p:grpSpPr>
+        <a:xfrm>
+          <a:off x="0" y="0"/>
+          <a:ext cx="0" cy="0"/>
+          <a:chOff x="0" y="0"/>
+          <a:chExt cx="0" cy="0"/>
+        </a:xfrm>
+      </p:grpSpPr>
+      <p:sp>
+        <p:nvSpPr>
+          <p:cNvPr id="2" name="Title 1"/>
+          <p:cNvSpPr>
+            <a:spLocks noGrp="1"/>
+          </p:cNvSpPr>
+          <p:nvPr>
+            <p:ph type="title"/>
+          </p:nvPr>
+        </p:nvSpPr>
+        <p:spPr/>
+        <p:txBody>
+          <a:bodyPr/>
+          <a:lstStyle/>
+          <a:p>
+            <a:r>
+              <a:rPr lang="en-CA" dirty="0" smtClean="0"/>
               <a:t>What is </a:t>
             </a:r>
             <a:r>
@@ -14370,7 +15826,7 @@
 </p:sld>
 </file>
 
-<file path=ppt/slides/slide5.xml><?xml version="1.0" encoding="utf-8"?>
+<file path=ppt/slides/slide6.xml><?xml version="1.0" encoding="utf-8"?>
 <p:sld xmlns:a="http://schemas.openxmlformats.org/drawingml/2006/main" xmlns:r="http://schemas.openxmlformats.org/officeDocument/2006/relationships" xmlns:p="http://schemas.openxmlformats.org/presentationml/2006/main">
   <p:cSld>
     <p:spTree>
@@ -14449,7 +15905,7 @@
 </p:sld>
 </file>
 
-<file path=ppt/slides/slide6.xml><?xml version="1.0" encoding="utf-8"?>
+<file path=ppt/slides/slide7.xml><?xml version="1.0" encoding="utf-8"?>
 <p:sld xmlns:a="http://schemas.openxmlformats.org/drawingml/2006/main" xmlns:r="http://schemas.openxmlformats.org/officeDocument/2006/relationships" xmlns:p="http://schemas.openxmlformats.org/presentationml/2006/main">
   <p:cSld>
     <p:spTree>
@@ -14495,7 +15951,7 @@
       </p:sp>
       <p:pic>
         <p:nvPicPr>
-          <p:cNvPr id="4" name="Content Placeholder 3"/>
+          <p:cNvPr id="6" name="Content Placeholder 5"/>
           <p:cNvPicPr>
             <a:picLocks noGrp="1" noChangeAspect="1"/>
           </p:cNvPicPr>
@@ -14504,15 +15960,21 @@
           </p:nvPr>
         </p:nvPicPr>
         <p:blipFill>
-          <a:blip r:embed="rId2"/>
+          <a:blip r:embed="rId2">
+            <a:extLst>
+              <a:ext uri="{28A0092B-C50C-407E-A947-70E740481C1C}">
+                <a14:useLocalDpi xmlns:a14="http://schemas.microsoft.com/office/drawing/2010/main" val="0"/>
+              </a:ext>
+            </a:extLst>
+          </a:blip>
           <a:stretch>
             <a:fillRect/>
           </a:stretch>
         </p:blipFill>
         <p:spPr>
           <a:xfrm>
-            <a:off x="2182825" y="2603500"/>
-            <a:ext cx="6707163" cy="3416300"/>
+            <a:off x="1155700" y="2740193"/>
+            <a:ext cx="8761413" cy="3142914"/>
           </a:xfrm>
           <a:prstGeom prst="rect">
             <a:avLst/>
@@ -14532,7 +15994,7 @@
 </p:sld>
 </file>
 
-<file path=ppt/slides/slide7.xml><?xml version="1.0" encoding="utf-8"?>
+<file path=ppt/slides/slide8.xml><?xml version="1.0" encoding="utf-8"?>
 <p:sld xmlns:a="http://schemas.openxmlformats.org/drawingml/2006/main" xmlns:r="http://schemas.openxmlformats.org/officeDocument/2006/relationships" xmlns:p="http://schemas.openxmlformats.org/presentationml/2006/main">
   <p:cSld>
     <p:spTree>
@@ -14606,6 +16068,127 @@
     <p:extLst>
       <p:ext uri="{BB962C8B-B14F-4D97-AF65-F5344CB8AC3E}">
         <p14:creationId xmlns:p14="http://schemas.microsoft.com/office/powerpoint/2010/main" val="914395764"/>
+      </p:ext>
+    </p:extLst>
+  </p:cSld>
+  <p:clrMapOvr>
+    <a:masterClrMapping/>
+  </p:clrMapOvr>
+</p:sld>
+</file>
+
+<file path=ppt/slides/slide9.xml><?xml version="1.0" encoding="utf-8"?>
+<p:sld xmlns:a="http://schemas.openxmlformats.org/drawingml/2006/main" xmlns:r="http://schemas.openxmlformats.org/officeDocument/2006/relationships" xmlns:p="http://schemas.openxmlformats.org/presentationml/2006/main">
+  <p:cSld>
+    <p:spTree>
+      <p:nvGrpSpPr>
+        <p:cNvPr id="1" name=""/>
+        <p:cNvGrpSpPr/>
+        <p:nvPr/>
+      </p:nvGrpSpPr>
+      <p:grpSpPr>
+        <a:xfrm>
+          <a:off x="0" y="0"/>
+          <a:ext cx="0" cy="0"/>
+          <a:chOff x="0" y="0"/>
+          <a:chExt cx="0" cy="0"/>
+        </a:xfrm>
+      </p:grpSpPr>
+      <p:sp>
+        <p:nvSpPr>
+          <p:cNvPr id="2" name="Title 1"/>
+          <p:cNvSpPr>
+            <a:spLocks noGrp="1"/>
+          </p:cNvSpPr>
+          <p:nvPr>
+            <p:ph type="title"/>
+          </p:nvPr>
+        </p:nvSpPr>
+        <p:spPr/>
+        <p:txBody>
+          <a:bodyPr/>
+          <a:lstStyle/>
+          <a:p>
+            <a:r>
+              <a:rPr lang="en-CA" dirty="0" smtClean="0"/>
+              <a:t>.NET Classes Implemented</a:t>
+            </a:r>
+            <a:endParaRPr lang="en-CA" dirty="0"/>
+          </a:p>
+        </p:txBody>
+      </p:sp>
+      <p:sp>
+        <p:nvSpPr>
+          <p:cNvPr id="3" name="Content Placeholder 2"/>
+          <p:cNvSpPr>
+            <a:spLocks noGrp="1"/>
+          </p:cNvSpPr>
+          <p:nvPr>
+            <p:ph idx="1"/>
+          </p:nvPr>
+        </p:nvSpPr>
+        <p:spPr>
+          <a:xfrm>
+            <a:off x="1154955" y="2603500"/>
+            <a:ext cx="3574987" cy="3416300"/>
+          </a:xfrm>
+        </p:spPr>
+        <p:txBody>
+          <a:bodyPr/>
+          <a:lstStyle/>
+          <a:p>
+            <a:r>
+              <a:rPr lang="en-CA" dirty="0" err="1"/>
+              <a:t>DataGridView</a:t>
+            </a:r>
+            <a:endParaRPr lang="en-CA" dirty="0"/>
+          </a:p>
+          <a:p>
+            <a:pPr lvl="1"/>
+            <a:r>
+              <a:rPr lang="en-CA" dirty="0" err="1"/>
+              <a:t>GridColumn</a:t>
+            </a:r>
+            <a:endParaRPr lang="en-CA" dirty="0"/>
+          </a:p>
+          <a:p>
+            <a:pPr lvl="1"/>
+            <a:r>
+              <a:rPr lang="en-CA" dirty="0" err="1" smtClean="0"/>
+              <a:t>CellStyle</a:t>
+            </a:r>
+            <a:endParaRPr lang="en-CA" dirty="0"/>
+          </a:p>
+          <a:p>
+            <a:pPr lvl="2"/>
+            <a:r>
+              <a:rPr lang="en-CA" dirty="0" smtClean="0"/>
+              <a:t>Color</a:t>
+            </a:r>
+          </a:p>
+          <a:p>
+            <a:pPr lvl="2"/>
+            <a:r>
+              <a:rPr lang="en-CA" dirty="0" smtClean="0"/>
+              <a:t>Font</a:t>
+            </a:r>
+          </a:p>
+          <a:p>
+            <a:endParaRPr lang="en-CA" dirty="0" smtClean="0"/>
+          </a:p>
+          <a:p>
+            <a:r>
+              <a:rPr lang="en-CA" dirty="0" err="1" smtClean="0"/>
+              <a:t>DataTable</a:t>
+            </a:r>
+            <a:endParaRPr lang="en-CA" dirty="0" smtClean="0"/>
+          </a:p>
+        </p:txBody>
+      </p:sp>
+    </p:spTree>
+    <p:extLst>
+      <p:ext uri="{BB962C8B-B14F-4D97-AF65-F5344CB8AC3E}">
+        <p14:creationId xmlns:p14="http://schemas.microsoft.com/office/powerpoint/2010/main" val="4258889242"/>
       </p:ext>
     </p:extLst>
   </p:cSld>

</xml_diff>

<commit_message>
presentation at user group meeting in calgary
</commit_message>
<xml_diff>
--- a/documentation/Project Overview - UserGroup Presentation.pptx
+++ b/documentation/Project Overview - UserGroup Presentation.pptx
@@ -772,7 +772,7 @@
             <a:fld id="{1E700B27-DE4C-4B9E-BB11-B9027034A00F}" type="datetimeFigureOut">
               <a:rPr lang="en-US" dirty="0"/>
               <a:pPr/>
-              <a:t>10/26/2015</a:t>
+              <a:t>10/29/2015</a:t>
             </a:fld>
             <a:endParaRPr lang="en-US" dirty="0"/>
           </a:p>
@@ -1892,7 +1892,7 @@
           <a:p>
             <a:fld id="{C40F4739-9812-4A9F-890D-2AD6BA5F6EE8}" type="datetimeFigureOut">
               <a:rPr lang="en-US" dirty="0"/>
-              <a:t>10/26/2015</a:t>
+              <a:t>10/29/2015</a:t>
             </a:fld>
             <a:endParaRPr lang="en-US" dirty="0"/>
           </a:p>
@@ -2903,7 +2903,7 @@
           <a:p>
             <a:fld id="{18845AC5-A3F8-44AA-BA8F-596CDCC976D3}" type="datetimeFigureOut">
               <a:rPr lang="en-US" dirty="0"/>
-              <a:t>10/26/2015</a:t>
+              <a:t>10/29/2015</a:t>
             </a:fld>
             <a:endParaRPr lang="en-US" dirty="0"/>
           </a:p>
@@ -4073,7 +4073,7 @@
           <a:p>
             <a:fld id="{C873B183-A821-4095-A363-9EC968635539}" type="datetimeFigureOut">
               <a:rPr lang="en-US" dirty="0"/>
-              <a:t>10/26/2015</a:t>
+              <a:t>10/29/2015</a:t>
             </a:fld>
             <a:endParaRPr lang="en-US" dirty="0"/>
           </a:p>
@@ -5134,7 +5134,7 @@
           <a:p>
             <a:fld id="{174D01B4-0AA5-45E6-B2E6-5FA4078AEBCF}" type="datetimeFigureOut">
               <a:rPr lang="en-US" dirty="0"/>
-              <a:t>10/26/2015</a:t>
+              <a:t>10/29/2015</a:t>
             </a:fld>
             <a:endParaRPr lang="en-US" dirty="0"/>
           </a:p>
@@ -5780,7 +5780,7 @@
           <a:p>
             <a:fld id="{4147335C-0450-40D7-8612-B3203BED4F28}" type="datetimeFigureOut">
               <a:rPr lang="en-US" dirty="0"/>
-              <a:t>10/26/2015</a:t>
+              <a:t>10/29/2015</a:t>
             </a:fld>
             <a:endParaRPr lang="en-US" dirty="0"/>
           </a:p>
@@ -6627,7 +6627,7 @@
           <a:p>
             <a:fld id="{D246A105-2A1C-4284-B4EA-07CF89B1A393}" type="datetimeFigureOut">
               <a:rPr lang="en-US" dirty="0"/>
-              <a:t>10/26/2015</a:t>
+              <a:t>10/29/2015</a:t>
             </a:fld>
             <a:endParaRPr lang="en-US" dirty="0"/>
           </a:p>
@@ -6802,7 +6802,7 @@
           <a:p>
             <a:fld id="{80DBE609-F3F2-45E6-BD6A-E03A8C86C1AE}" type="datetimeFigureOut">
               <a:rPr lang="en-US" dirty="0"/>
-              <a:t>10/26/2015</a:t>
+              <a:t>10/29/2015</a:t>
             </a:fld>
             <a:endParaRPr lang="en-US" dirty="0"/>
           </a:p>
@@ -7800,7 +7800,7 @@
           <a:p>
             <a:fld id="{7A24AD68-089C-4467-A8F3-EA2BBCA6B44E}" type="datetimeFigureOut">
               <a:rPr lang="en-US" dirty="0"/>
-              <a:t>10/26/2015</a:t>
+              <a:t>10/29/2015</a:t>
             </a:fld>
             <a:endParaRPr lang="en-US" dirty="0"/>
           </a:p>
@@ -8006,7 +8006,7 @@
           <a:p>
             <a:fld id="{75C51FCE-E4BB-4680-8E50-3C0E348D2609}" type="datetimeFigureOut">
               <a:rPr lang="en-US" dirty="0"/>
-              <a:t>10/26/2015</a:t>
+              <a:t>10/29/2015</a:t>
             </a:fld>
             <a:endParaRPr lang="en-US" dirty="0"/>
           </a:p>
@@ -9068,7 +9068,7 @@
           <a:p>
             <a:fld id="{8AAA073D-A903-47F8-8D16-77642FB0DF1F}" type="datetimeFigureOut">
               <a:rPr lang="en-US" dirty="0"/>
-              <a:t>10/26/2015</a:t>
+              <a:t>10/29/2015</a:t>
             </a:fld>
             <a:endParaRPr lang="en-US" dirty="0"/>
           </a:p>
@@ -9340,7 +9340,7 @@
           <a:p>
             <a:fld id="{AB91FA40-626B-4CA1-85D0-7A9016E395BA}" type="datetimeFigureOut">
               <a:rPr lang="en-US" dirty="0"/>
-              <a:t>10/26/2015</a:t>
+              <a:t>10/29/2015</a:t>
             </a:fld>
             <a:endParaRPr lang="en-US" dirty="0"/>
           </a:p>
@@ -9722,7 +9722,7 @@
           <a:p>
             <a:fld id="{C3F425EA-B9DC-48A7-991E-9A82573B1B21}" type="datetimeFigureOut">
               <a:rPr lang="en-US" dirty="0"/>
-              <a:t>10/26/2015</a:t>
+              <a:t>10/29/2015</a:t>
             </a:fld>
             <a:endParaRPr lang="en-US" dirty="0"/>
           </a:p>
@@ -9840,7 +9840,7 @@
           <a:p>
             <a:fld id="{66CB97F8-6CEB-469B-AFCC-889F2A2B1D5A}" type="datetimeFigureOut">
               <a:rPr lang="en-US" dirty="0"/>
-              <a:t>10/26/2015</a:t>
+              <a:t>10/29/2015</a:t>
             </a:fld>
             <a:endParaRPr lang="en-US" dirty="0"/>
           </a:p>
@@ -9935,7 +9935,7 @@
           <a:p>
             <a:fld id="{8FA9179F-009E-4FA5-B091-7EBB82A185BD}" type="datetimeFigureOut">
               <a:rPr lang="en-US" dirty="0"/>
-              <a:t>10/26/2015</a:t>
+              <a:t>10/29/2015</a:t>
             </a:fld>
             <a:endParaRPr lang="en-US" dirty="0"/>
           </a:p>
@@ -11044,7 +11044,7 @@
           <a:p>
             <a:fld id="{8E665CEB-0076-4E37-B880-BCEA9784DE0A}" type="datetimeFigureOut">
               <a:rPr lang="en-US" dirty="0"/>
-              <a:t>10/26/2015</a:t>
+              <a:t>10/29/2015</a:t>
             </a:fld>
             <a:endParaRPr lang="en-US" dirty="0"/>
           </a:p>
@@ -12177,7 +12177,7 @@
           <a:p>
             <a:fld id="{A6149E5E-3896-4118-99A7-7B85668F1C5E}" type="datetimeFigureOut">
               <a:rPr lang="en-US" dirty="0"/>
-              <a:t>10/26/2015</a:t>
+              <a:t>10/29/2015</a:t>
             </a:fld>
             <a:endParaRPr lang="en-US" dirty="0"/>
           </a:p>
@@ -13205,7 +13205,7 @@
           <a:p>
             <a:fld id="{7E0D914D-B099-4142-A885-11F276715148}" type="datetimeFigureOut">
               <a:rPr lang="en-US" dirty="0"/>
-              <a:t>10/26/2015</a:t>
+              <a:t>10/29/2015</a:t>
             </a:fld>
             <a:endParaRPr lang="en-US" dirty="0"/>
           </a:p>
@@ -13937,11 +13937,7 @@
             </a:r>
             <a:r>
               <a:rPr lang="en-CA" sz="2000" dirty="0" smtClean="0"/>
-              <a:t>: </a:t>
-            </a:r>
-            <a:r>
-              <a:rPr lang="en-CA" sz="2000" dirty="0" smtClean="0"/>
-              <a:t>unipsycho@gmail.com</a:t>
+              <a:t>: unipsycho@gmail.com</a:t>
             </a:r>
             <a:endParaRPr lang="en-CA" sz="2000" dirty="0"/>
           </a:p>
@@ -14749,7 +14745,11 @@
           <a:p>
             <a:r>
               <a:rPr lang="en-CA" dirty="0" smtClean="0"/>
-              <a:t>Email him at </a:t>
+              <a:t>Email him </a:t>
+            </a:r>
+            <a:r>
+              <a:rPr lang="en-CA" dirty="0" smtClean="0"/>
+              <a:t>personally at </a:t>
             </a:r>
             <a:r>
               <a:rPr lang="en-CA" dirty="0" smtClean="0">
@@ -14981,14 +14981,27 @@
             <p:ph type="title"/>
           </p:nvPr>
         </p:nvSpPr>
-        <p:spPr/>
+        <p:spPr>
+          <a:xfrm>
+            <a:off x="674664" y="696574"/>
+            <a:ext cx="8761413" cy="706964"/>
+          </a:xfrm>
+        </p:spPr>
         <p:txBody>
           <a:bodyPr/>
           <a:lstStyle/>
           <a:p>
             <a:r>
               <a:rPr lang="en-CA" dirty="0" smtClean="0"/>
-              <a:t>About Mike</a:t>
+              <a:t>About </a:t>
+            </a:r>
+            <a:r>
+              <a:rPr lang="en-CA" dirty="0" smtClean="0"/>
+              <a:t>Mike @</a:t>
+            </a:r>
+            <a:r>
+              <a:rPr lang="en-CA" dirty="0" err="1" smtClean="0"/>
+              <a:t>Prolucid</a:t>
             </a:r>
             <a:endParaRPr lang="en-CA" dirty="0"/>
           </a:p>
@@ -15018,7 +15031,19 @@
           <a:p>
             <a:r>
               <a:rPr lang="en-CA" dirty="0" smtClean="0"/>
-              <a:t>Led and built teams &amp; innovation within product development groups </a:t>
+              <a:t>Has led </a:t>
+            </a:r>
+            <a:r>
+              <a:rPr lang="en-CA" dirty="0" smtClean="0"/>
+              <a:t>and built teams &amp; innovation </a:t>
+            </a:r>
+            <a:r>
+              <a:rPr lang="en-CA" dirty="0" smtClean="0"/>
+              <a:t>in </a:t>
+            </a:r>
+            <a:r>
+              <a:rPr lang="en-CA" dirty="0" smtClean="0"/>
+              <a:t>product development groups </a:t>
             </a:r>
           </a:p>
           <a:p>
@@ -15054,8 +15079,8 @@
         </p:nvSpPr>
         <p:spPr>
           <a:xfrm>
-            <a:off x="5458121" y="399012"/>
-            <a:ext cx="4688892" cy="3522518"/>
+            <a:off x="6077527" y="979054"/>
+            <a:ext cx="3526386" cy="3024713"/>
           </a:xfrm>
           <a:prstGeom prst="rect">
             <a:avLst/>
@@ -15296,17 +15321,6 @@
             </a:lvl9pPr>
           </a:lstStyle>
           <a:p>
-            <a:endParaRPr lang="en-CA" dirty="0" smtClean="0"/>
-          </a:p>
-          <a:p>
-            <a:r>
-              <a:rPr lang="en-CA" dirty="0" smtClean="0"/>
-              <a:t>Mike’s currently working for </a:t>
-            </a:r>
-            <a:r>
-              <a:rPr lang="en-CA" dirty="0" err="1" smtClean="0"/>
-              <a:t>Prolucid</a:t>
-            </a:r>
             <a:endParaRPr lang="en-CA" dirty="0" smtClean="0"/>
           </a:p>
           <a:p>
@@ -15397,6 +15411,14 @@
   <p:clrMapOvr>
     <a:masterClrMapping/>
   </p:clrMapOvr>
+  <mc:AlternateContent xmlns:mc="http://schemas.openxmlformats.org/markup-compatibility/2006">
+    <mc:Choice xmlns:p14="http://schemas.microsoft.com/office/powerpoint/2010/main" Requires="p14">
+      <p:transition spd="slow" p14:dur="2000"/>
+    </mc:Choice>
+    <mc:Fallback>
+      <p:transition spd="slow"/>
+    </mc:Fallback>
+  </mc:AlternateContent>
 </p:sld>
 </file>
 

</xml_diff>